<commit_message>
Final version of Person-Scenario
</commit_message>
<xml_diff>
--- a/Models/Person-Scenario.pptx
+++ b/Models/Person-Scenario.pptx
@@ -520,7 +520,7 @@
           <a:p>
             <a:fld id="{A7B2D771-2BBF-4B1C-9C01-58156F50375D}" type="datetimeFigureOut">
               <a:rPr lang="es-ES" smtClean="0"/>
-              <a:t>06/02/2025</a:t>
+              <a:t>07/02/2025</a:t>
             </a:fld>
             <a:endParaRPr lang="es-ES"/>
           </a:p>
@@ -699,7 +699,7 @@
           <a:p>
             <a:fld id="{A7B2D771-2BBF-4B1C-9C01-58156F50375D}" type="datetimeFigureOut">
               <a:rPr lang="es-ES" smtClean="0"/>
-              <a:t>06/02/2025</a:t>
+              <a:t>07/02/2025</a:t>
             </a:fld>
             <a:endParaRPr lang="es-ES"/>
           </a:p>
@@ -879,7 +879,7 @@
           <a:p>
             <a:fld id="{A7B2D771-2BBF-4B1C-9C01-58156F50375D}" type="datetimeFigureOut">
               <a:rPr lang="es-ES" smtClean="0"/>
-              <a:t>06/02/2025</a:t>
+              <a:t>07/02/2025</a:t>
             </a:fld>
             <a:endParaRPr lang="es-ES"/>
           </a:p>
@@ -1049,7 +1049,7 @@
           <a:p>
             <a:fld id="{A7B2D771-2BBF-4B1C-9C01-58156F50375D}" type="datetimeFigureOut">
               <a:rPr lang="es-ES" smtClean="0"/>
-              <a:t>06/02/2025</a:t>
+              <a:t>07/02/2025</a:t>
             </a:fld>
             <a:endParaRPr lang="es-ES"/>
           </a:p>
@@ -1362,7 +1362,7 @@
           <a:p>
             <a:fld id="{A7B2D771-2BBF-4B1C-9C01-58156F50375D}" type="datetimeFigureOut">
               <a:rPr lang="es-ES" smtClean="0"/>
-              <a:t>06/02/2025</a:t>
+              <a:t>07/02/2025</a:t>
             </a:fld>
             <a:endParaRPr lang="es-ES"/>
           </a:p>
@@ -1748,7 +1748,7 @@
           <a:p>
             <a:fld id="{A7B2D771-2BBF-4B1C-9C01-58156F50375D}" type="datetimeFigureOut">
               <a:rPr lang="es-ES" smtClean="0"/>
-              <a:t>06/02/2025</a:t>
+              <a:t>07/02/2025</a:t>
             </a:fld>
             <a:endParaRPr lang="es-ES"/>
           </a:p>
@@ -2182,7 +2182,7 @@
           <a:p>
             <a:fld id="{A7B2D771-2BBF-4B1C-9C01-58156F50375D}" type="datetimeFigureOut">
               <a:rPr lang="es-ES" smtClean="0"/>
-              <a:t>06/02/2025</a:t>
+              <a:t>07/02/2025</a:t>
             </a:fld>
             <a:endParaRPr lang="es-ES"/>
           </a:p>
@@ -2300,7 +2300,7 @@
           <a:p>
             <a:fld id="{A7B2D771-2BBF-4B1C-9C01-58156F50375D}" type="datetimeFigureOut">
               <a:rPr lang="es-ES" smtClean="0"/>
-              <a:t>06/02/2025</a:t>
+              <a:t>07/02/2025</a:t>
             </a:fld>
             <a:endParaRPr lang="es-ES"/>
           </a:p>
@@ -2395,7 +2395,7 @@
           <a:p>
             <a:fld id="{A7B2D771-2BBF-4B1C-9C01-58156F50375D}" type="datetimeFigureOut">
               <a:rPr lang="es-ES" smtClean="0"/>
-              <a:t>06/02/2025</a:t>
+              <a:t>07/02/2025</a:t>
             </a:fld>
             <a:endParaRPr lang="es-ES"/>
           </a:p>
@@ -2745,7 +2745,7 @@
           <a:p>
             <a:fld id="{A7B2D771-2BBF-4B1C-9C01-58156F50375D}" type="datetimeFigureOut">
               <a:rPr lang="es-ES" smtClean="0"/>
-              <a:t>06/02/2025</a:t>
+              <a:t>07/02/2025</a:t>
             </a:fld>
             <a:endParaRPr lang="es-ES"/>
           </a:p>
@@ -3170,7 +3170,7 @@
           <a:p>
             <a:fld id="{A7B2D771-2BBF-4B1C-9C01-58156F50375D}" type="datetimeFigureOut">
               <a:rPr lang="es-ES" smtClean="0"/>
-              <a:t>06/02/2025</a:t>
+              <a:t>07/02/2025</a:t>
             </a:fld>
             <a:endParaRPr lang="es-ES"/>
           </a:p>
@@ -3457,7 +3457,7 @@
           <a:p>
             <a:fld id="{A7B2D771-2BBF-4B1C-9C01-58156F50375D}" type="datetimeFigureOut">
               <a:rPr lang="es-ES" smtClean="0"/>
-              <a:t>06/02/2025</a:t>
+              <a:t>07/02/2025</a:t>
             </a:fld>
             <a:endParaRPr lang="es-ES"/>
           </a:p>
@@ -5529,20 +5529,7 @@
               <a:rPr lang="es-ES" altLang="es-ES" sz="1800" b="1" dirty="0" err="1">
                 <a:latin typeface="Arial" panose="020B0604020202020204" pitchFamily="34" charset="0"/>
               </a:rPr>
-              <a:t>O</a:t>
-            </a:r>
-            <a:r>
-              <a:rPr kumimoji="0" lang="es-ES" altLang="es-ES" sz="1800" b="1" i="0" u="none" strike="noStrike" cap="none" normalizeH="0" baseline="0" dirty="0" err="1">
-                <a:ln>
-                  <a:noFill/>
-                </a:ln>
-                <a:solidFill>
-                  <a:schemeClr val="tx1"/>
-                </a:solidFill>
-                <a:effectLst/>
-                <a:latin typeface="Arial" panose="020B0604020202020204" pitchFamily="34" charset="0"/>
-              </a:rPr>
-              <a:t>rders</a:t>
+              <a:t>Items</a:t>
             </a:r>
             <a:r>
               <a:rPr kumimoji="0" lang="es-ES" altLang="es-ES" sz="1800" b="0" i="0" u="none" strike="noStrike" cap="none" normalizeH="0" baseline="0" dirty="0">
@@ -5808,7 +5795,7 @@
               <a:t> </a:t>
             </a:r>
             <a:r>
-              <a:rPr kumimoji="0" lang="es-ES" altLang="es-ES" sz="1800" b="0" i="0" u="none" strike="noStrike" cap="none" normalizeH="0" baseline="0" dirty="0" err="1">
+              <a:rPr kumimoji="0" lang="es-ES" altLang="es-ES" sz="1800" b="1" i="0" u="none" strike="noStrike" cap="none" normalizeH="0" baseline="0" dirty="0" err="1">
                 <a:ln>
                   <a:noFill/>
                 </a:ln>
@@ -6399,20 +6386,7 @@
               <a:rPr lang="es-ES" altLang="es-ES" sz="1800" b="1" dirty="0" err="1">
                 <a:latin typeface="Arial" panose="020B0604020202020204" pitchFamily="34" charset="0"/>
               </a:rPr>
-              <a:t>O</a:t>
-            </a:r>
-            <a:r>
-              <a:rPr kumimoji="0" lang="es-ES" altLang="es-ES" sz="1800" b="1" i="0" u="none" strike="noStrike" cap="none" normalizeH="0" baseline="0" dirty="0" err="1">
-                <a:ln>
-                  <a:noFill/>
-                </a:ln>
-                <a:solidFill>
-                  <a:schemeClr val="tx1"/>
-                </a:solidFill>
-                <a:effectLst/>
-                <a:latin typeface="Arial" panose="020B0604020202020204" pitchFamily="34" charset="0"/>
-              </a:rPr>
-              <a:t>rders</a:t>
+              <a:t>Items</a:t>
             </a:r>
             <a:r>
               <a:rPr kumimoji="0" lang="es-ES" altLang="es-ES" sz="1800" b="0" i="0" u="none" strike="noStrike" cap="none" normalizeH="0" baseline="0" dirty="0">
@@ -8237,7 +8211,7 @@
                 <a:effectLst/>
                 <a:latin typeface="Arial" panose="020B0604020202020204" pitchFamily="34" charset="0"/>
               </a:rPr>
-              <a:t>Orders</a:t>
+              <a:t>Items</a:t>
             </a:r>
             <a:r>
               <a:rPr kumimoji="0" lang="es-ES" altLang="es-ES" sz="1800" b="0" i="0" u="none" strike="noStrike" cap="none" normalizeH="0" baseline="0" dirty="0">
@@ -11066,7 +11040,7 @@
                 <a:effectLst/>
                 <a:latin typeface="Arial" panose="020B0604020202020204" pitchFamily="34" charset="0"/>
               </a:rPr>
-              <a:t>Orders</a:t>
+              <a:t>Items</a:t>
             </a:r>
             <a:r>
               <a:rPr kumimoji="0" lang="es-ES" altLang="es-ES" sz="1800" b="0" i="0" u="none" strike="noStrike" cap="none" normalizeH="0" baseline="0" dirty="0">
@@ -12418,7 +12392,7 @@
                 <a:latin typeface="Arial" panose="020B0604020202020204" pitchFamily="34" charset="0"/>
                 <a:cs typeface="Arial" panose="020B0604020202020204" pitchFamily="34" charset="0"/>
               </a:rPr>
-              <a:t>Orders</a:t>
+              <a:t>Items</a:t>
             </a:r>
             <a:r>
               <a:rPr lang="en-US" sz="7200" dirty="0">
@@ -12461,7 +12435,21 @@
                 <a:latin typeface="Arial" panose="020B0604020202020204" pitchFamily="34" charset="0"/>
                 <a:cs typeface="Arial" panose="020B0604020202020204" pitchFamily="34" charset="0"/>
               </a:rPr>
-              <a:t>change the item, as description does not convince</a:t>
+              <a:t>change the item </a:t>
+            </a:r>
+            <a:r>
+              <a:rPr lang="en-US" sz="7200" b="1" dirty="0">
+                <a:latin typeface="Arial" panose="020B0604020202020204" pitchFamily="34" charset="0"/>
+                <a:cs typeface="Arial" panose="020B0604020202020204" pitchFamily="34" charset="0"/>
+              </a:rPr>
+              <a:t>Type</a:t>
+            </a:r>
+            <a:r>
+              <a:rPr lang="en-US" sz="7200" dirty="0">
+                <a:latin typeface="Arial" panose="020B0604020202020204" pitchFamily="34" charset="0"/>
+                <a:cs typeface="Arial" panose="020B0604020202020204" pitchFamily="34" charset="0"/>
+              </a:rPr>
+              <a:t>, as description does not</a:t>
             </a:r>
           </a:p>
           <a:p>
@@ -12473,21 +12461,14 @@
                 <a:latin typeface="Arial" panose="020B0604020202020204" pitchFamily="34" charset="0"/>
                 <a:cs typeface="Arial" panose="020B0604020202020204" pitchFamily="34" charset="0"/>
               </a:rPr>
-              <a:t>him. Later, James checks the </a:t>
+              <a:t>convince him. Later, James checks the </a:t>
             </a:r>
             <a:r>
               <a:rPr lang="en-US" sz="7200" b="1" dirty="0">
                 <a:latin typeface="Arial" panose="020B0604020202020204" pitchFamily="34" charset="0"/>
                 <a:cs typeface="Arial" panose="020B0604020202020204" pitchFamily="34" charset="0"/>
               </a:rPr>
-              <a:t>Orders </a:t>
-            </a:r>
-            <a:r>
-              <a:rPr lang="en-US" sz="7200" dirty="0">
-                <a:latin typeface="Arial" panose="020B0604020202020204" pitchFamily="34" charset="0"/>
-                <a:cs typeface="Arial" panose="020B0604020202020204" pitchFamily="34" charset="0"/>
-              </a:rPr>
-              <a:t>section</a:t>
+              <a:t>Items</a:t>
             </a:r>
           </a:p>
           <a:p>
@@ -12499,7 +12480,7 @@
                 <a:latin typeface="Arial" panose="020B0604020202020204" pitchFamily="34" charset="0"/>
                 <a:cs typeface="Arial" panose="020B0604020202020204" pitchFamily="34" charset="0"/>
               </a:rPr>
-              <a:t>to track his order's shipping status and notices</a:t>
+              <a:t>section to track his order's shipping status and</a:t>
             </a:r>
           </a:p>
           <a:p>
@@ -12511,7 +12492,7 @@
                 <a:latin typeface="Arial" panose="020B0604020202020204" pitchFamily="34" charset="0"/>
                 <a:cs typeface="Arial" panose="020B0604020202020204" pitchFamily="34" charset="0"/>
               </a:rPr>
-              <a:t>that price was not what he firstly saw. He then</a:t>
+              <a:t>notices that price was not what he firstly saw.</a:t>
             </a:r>
           </a:p>
           <a:p>
@@ -12523,7 +12504,7 @@
                 <a:latin typeface="Arial" panose="020B0604020202020204" pitchFamily="34" charset="0"/>
                 <a:cs typeface="Arial" panose="020B0604020202020204" pitchFamily="34" charset="0"/>
               </a:rPr>
-              <a:t>contacts support to address the issue.</a:t>
+              <a:t>Het then contacts support to address the issue.</a:t>
             </a:r>
           </a:p>
           <a:p>
@@ -14920,7 +14901,7 @@
                 <a:effectLst/>
                 <a:latin typeface="Arial" panose="020B0604020202020204" pitchFamily="34" charset="0"/>
               </a:rPr>
-              <a:t>Orders</a:t>
+              <a:t>Items</a:t>
             </a:r>
             <a:r>
               <a:rPr kumimoji="0" lang="es-ES" altLang="es-ES" sz="1800" b="0" i="0" u="none" strike="noStrike" cap="none" normalizeH="0" baseline="0" dirty="0">
@@ -14981,17 +14962,30 @@
               <a:t>he </a:t>
             </a:r>
             <a:r>
-              <a:rPr kumimoji="0" lang="es-ES" altLang="es-ES" sz="1800" b="0" i="0" u="none" strike="noStrike" cap="none" normalizeH="0" baseline="0">
-                <a:ln>
-                  <a:noFill/>
-                </a:ln>
-                <a:solidFill>
-                  <a:schemeClr val="tx1"/>
-                </a:solidFill>
-                <a:effectLst/>
-                <a:latin typeface="Arial" panose="020B0604020202020204" pitchFamily="34" charset="0"/>
-              </a:rPr>
-              <a:t>starts </a:t>
+              <a:rPr kumimoji="0" lang="es-ES" altLang="es-ES" sz="1800" b="0" i="0" u="none" strike="noStrike" cap="none" normalizeH="0" baseline="0" dirty="0" err="1">
+                <a:ln>
+                  <a:noFill/>
+                </a:ln>
+                <a:solidFill>
+                  <a:schemeClr val="tx1"/>
+                </a:solidFill>
+                <a:effectLst/>
+                <a:latin typeface="Arial" panose="020B0604020202020204" pitchFamily="34" charset="0"/>
+              </a:rPr>
+              <a:t>starts</a:t>
+            </a:r>
+            <a:r>
+              <a:rPr kumimoji="0" lang="es-ES" altLang="es-ES" sz="1800" b="0" i="0" u="none" strike="noStrike" cap="none" normalizeH="0" baseline="0" dirty="0">
+                <a:ln>
+                  <a:noFill/>
+                </a:ln>
+                <a:solidFill>
+                  <a:schemeClr val="tx1"/>
+                </a:solidFill>
+                <a:effectLst/>
+                <a:latin typeface="Arial" panose="020B0604020202020204" pitchFamily="34" charset="0"/>
+              </a:rPr>
+              <a:t> </a:t>
             </a:r>
             <a:r>
               <a:rPr kumimoji="0" lang="es-ES" altLang="es-ES" sz="1800" b="0" i="0" u="none" strike="noStrike" cap="none" normalizeH="0" baseline="0" dirty="0" err="1">

</xml_diff>

<commit_message>
Final version Person Scenario
</commit_message>
<xml_diff>
--- a/Models/Person-Scenario.pptx
+++ b/Models/Person-Scenario.pptx
@@ -520,7 +520,7 @@
           <a:p>
             <a:fld id="{A7B2D771-2BBF-4B1C-9C01-58156F50375D}" type="datetimeFigureOut">
               <a:rPr lang="es-ES" smtClean="0"/>
-              <a:t>06/02/2025</a:t>
+              <a:t>07/02/2025</a:t>
             </a:fld>
             <a:endParaRPr lang="es-ES"/>
           </a:p>
@@ -699,7 +699,7 @@
           <a:p>
             <a:fld id="{A7B2D771-2BBF-4B1C-9C01-58156F50375D}" type="datetimeFigureOut">
               <a:rPr lang="es-ES" smtClean="0"/>
-              <a:t>06/02/2025</a:t>
+              <a:t>07/02/2025</a:t>
             </a:fld>
             <a:endParaRPr lang="es-ES"/>
           </a:p>
@@ -879,7 +879,7 @@
           <a:p>
             <a:fld id="{A7B2D771-2BBF-4B1C-9C01-58156F50375D}" type="datetimeFigureOut">
               <a:rPr lang="es-ES" smtClean="0"/>
-              <a:t>06/02/2025</a:t>
+              <a:t>07/02/2025</a:t>
             </a:fld>
             <a:endParaRPr lang="es-ES"/>
           </a:p>
@@ -1049,7 +1049,7 @@
           <a:p>
             <a:fld id="{A7B2D771-2BBF-4B1C-9C01-58156F50375D}" type="datetimeFigureOut">
               <a:rPr lang="es-ES" smtClean="0"/>
-              <a:t>06/02/2025</a:t>
+              <a:t>07/02/2025</a:t>
             </a:fld>
             <a:endParaRPr lang="es-ES"/>
           </a:p>
@@ -1362,7 +1362,7 @@
           <a:p>
             <a:fld id="{A7B2D771-2BBF-4B1C-9C01-58156F50375D}" type="datetimeFigureOut">
               <a:rPr lang="es-ES" smtClean="0"/>
-              <a:t>06/02/2025</a:t>
+              <a:t>07/02/2025</a:t>
             </a:fld>
             <a:endParaRPr lang="es-ES"/>
           </a:p>
@@ -1748,7 +1748,7 @@
           <a:p>
             <a:fld id="{A7B2D771-2BBF-4B1C-9C01-58156F50375D}" type="datetimeFigureOut">
               <a:rPr lang="es-ES" smtClean="0"/>
-              <a:t>06/02/2025</a:t>
+              <a:t>07/02/2025</a:t>
             </a:fld>
             <a:endParaRPr lang="es-ES"/>
           </a:p>
@@ -2182,7 +2182,7 @@
           <a:p>
             <a:fld id="{A7B2D771-2BBF-4B1C-9C01-58156F50375D}" type="datetimeFigureOut">
               <a:rPr lang="es-ES" smtClean="0"/>
-              <a:t>06/02/2025</a:t>
+              <a:t>07/02/2025</a:t>
             </a:fld>
             <a:endParaRPr lang="es-ES"/>
           </a:p>
@@ -2300,7 +2300,7 @@
           <a:p>
             <a:fld id="{A7B2D771-2BBF-4B1C-9C01-58156F50375D}" type="datetimeFigureOut">
               <a:rPr lang="es-ES" smtClean="0"/>
-              <a:t>06/02/2025</a:t>
+              <a:t>07/02/2025</a:t>
             </a:fld>
             <a:endParaRPr lang="es-ES"/>
           </a:p>
@@ -2395,7 +2395,7 @@
           <a:p>
             <a:fld id="{A7B2D771-2BBF-4B1C-9C01-58156F50375D}" type="datetimeFigureOut">
               <a:rPr lang="es-ES" smtClean="0"/>
-              <a:t>06/02/2025</a:t>
+              <a:t>07/02/2025</a:t>
             </a:fld>
             <a:endParaRPr lang="es-ES"/>
           </a:p>
@@ -2745,7 +2745,7 @@
           <a:p>
             <a:fld id="{A7B2D771-2BBF-4B1C-9C01-58156F50375D}" type="datetimeFigureOut">
               <a:rPr lang="es-ES" smtClean="0"/>
-              <a:t>06/02/2025</a:t>
+              <a:t>07/02/2025</a:t>
             </a:fld>
             <a:endParaRPr lang="es-ES"/>
           </a:p>
@@ -3170,7 +3170,7 @@
           <a:p>
             <a:fld id="{A7B2D771-2BBF-4B1C-9C01-58156F50375D}" type="datetimeFigureOut">
               <a:rPr lang="es-ES" smtClean="0"/>
-              <a:t>06/02/2025</a:t>
+              <a:t>07/02/2025</a:t>
             </a:fld>
             <a:endParaRPr lang="es-ES"/>
           </a:p>
@@ -3457,7 +3457,7 @@
           <a:p>
             <a:fld id="{A7B2D771-2BBF-4B1C-9C01-58156F50375D}" type="datetimeFigureOut">
               <a:rPr lang="es-ES" smtClean="0"/>
-              <a:t>06/02/2025</a:t>
+              <a:t>07/02/2025</a:t>
             </a:fld>
             <a:endParaRPr lang="es-ES"/>
           </a:p>
@@ -5529,20 +5529,7 @@
               <a:rPr lang="es-ES" altLang="es-ES" sz="1800" b="1" dirty="0" err="1">
                 <a:latin typeface="Arial" panose="020B0604020202020204" pitchFamily="34" charset="0"/>
               </a:rPr>
-              <a:t>O</a:t>
-            </a:r>
-            <a:r>
-              <a:rPr kumimoji="0" lang="es-ES" altLang="es-ES" sz="1800" b="1" i="0" u="none" strike="noStrike" cap="none" normalizeH="0" baseline="0" dirty="0" err="1">
-                <a:ln>
-                  <a:noFill/>
-                </a:ln>
-                <a:solidFill>
-                  <a:schemeClr val="tx1"/>
-                </a:solidFill>
-                <a:effectLst/>
-                <a:latin typeface="Arial" panose="020B0604020202020204" pitchFamily="34" charset="0"/>
-              </a:rPr>
-              <a:t>rders</a:t>
+              <a:t>Items</a:t>
             </a:r>
             <a:r>
               <a:rPr kumimoji="0" lang="es-ES" altLang="es-ES" sz="1800" b="0" i="0" u="none" strike="noStrike" cap="none" normalizeH="0" baseline="0" dirty="0">
@@ -5808,7 +5795,7 @@
               <a:t> </a:t>
             </a:r>
             <a:r>
-              <a:rPr kumimoji="0" lang="es-ES" altLang="es-ES" sz="1800" b="0" i="0" u="none" strike="noStrike" cap="none" normalizeH="0" baseline="0" dirty="0" err="1">
+              <a:rPr kumimoji="0" lang="es-ES" altLang="es-ES" sz="1800" b="1" i="0" u="none" strike="noStrike" cap="none" normalizeH="0" baseline="0" dirty="0" err="1">
                 <a:ln>
                   <a:noFill/>
                 </a:ln>
@@ -6399,20 +6386,7 @@
               <a:rPr lang="es-ES" altLang="es-ES" sz="1800" b="1" dirty="0" err="1">
                 <a:latin typeface="Arial" panose="020B0604020202020204" pitchFamily="34" charset="0"/>
               </a:rPr>
-              <a:t>O</a:t>
-            </a:r>
-            <a:r>
-              <a:rPr kumimoji="0" lang="es-ES" altLang="es-ES" sz="1800" b="1" i="0" u="none" strike="noStrike" cap="none" normalizeH="0" baseline="0" dirty="0" err="1">
-                <a:ln>
-                  <a:noFill/>
-                </a:ln>
-                <a:solidFill>
-                  <a:schemeClr val="tx1"/>
-                </a:solidFill>
-                <a:effectLst/>
-                <a:latin typeface="Arial" panose="020B0604020202020204" pitchFamily="34" charset="0"/>
-              </a:rPr>
-              <a:t>rders</a:t>
+              <a:t>Items</a:t>
             </a:r>
             <a:r>
               <a:rPr kumimoji="0" lang="es-ES" altLang="es-ES" sz="1800" b="0" i="0" u="none" strike="noStrike" cap="none" normalizeH="0" baseline="0" dirty="0">
@@ -8237,7 +8211,7 @@
                 <a:effectLst/>
                 <a:latin typeface="Arial" panose="020B0604020202020204" pitchFamily="34" charset="0"/>
               </a:rPr>
-              <a:t>Orders</a:t>
+              <a:t>Items</a:t>
             </a:r>
             <a:r>
               <a:rPr kumimoji="0" lang="es-ES" altLang="es-ES" sz="1800" b="0" i="0" u="none" strike="noStrike" cap="none" normalizeH="0" baseline="0" dirty="0">
@@ -11066,7 +11040,7 @@
                 <a:effectLst/>
                 <a:latin typeface="Arial" panose="020B0604020202020204" pitchFamily="34" charset="0"/>
               </a:rPr>
-              <a:t>Orders</a:t>
+              <a:t>Items</a:t>
             </a:r>
             <a:r>
               <a:rPr kumimoji="0" lang="es-ES" altLang="es-ES" sz="1800" b="0" i="0" u="none" strike="noStrike" cap="none" normalizeH="0" baseline="0" dirty="0">
@@ -12418,7 +12392,7 @@
                 <a:latin typeface="Arial" panose="020B0604020202020204" pitchFamily="34" charset="0"/>
                 <a:cs typeface="Arial" panose="020B0604020202020204" pitchFamily="34" charset="0"/>
               </a:rPr>
-              <a:t>Orders</a:t>
+              <a:t>Items</a:t>
             </a:r>
             <a:r>
               <a:rPr lang="en-US" sz="7200" dirty="0">
@@ -12461,7 +12435,21 @@
                 <a:latin typeface="Arial" panose="020B0604020202020204" pitchFamily="34" charset="0"/>
                 <a:cs typeface="Arial" panose="020B0604020202020204" pitchFamily="34" charset="0"/>
               </a:rPr>
-              <a:t>change the item, as description does not convince</a:t>
+              <a:t>change the item </a:t>
+            </a:r>
+            <a:r>
+              <a:rPr lang="en-US" sz="7200" b="1" dirty="0">
+                <a:latin typeface="Arial" panose="020B0604020202020204" pitchFamily="34" charset="0"/>
+                <a:cs typeface="Arial" panose="020B0604020202020204" pitchFamily="34" charset="0"/>
+              </a:rPr>
+              <a:t>Type</a:t>
+            </a:r>
+            <a:r>
+              <a:rPr lang="en-US" sz="7200" dirty="0">
+                <a:latin typeface="Arial" panose="020B0604020202020204" pitchFamily="34" charset="0"/>
+                <a:cs typeface="Arial" panose="020B0604020202020204" pitchFamily="34" charset="0"/>
+              </a:rPr>
+              <a:t>, as description does not</a:t>
             </a:r>
           </a:p>
           <a:p>
@@ -12473,21 +12461,14 @@
                 <a:latin typeface="Arial" panose="020B0604020202020204" pitchFamily="34" charset="0"/>
                 <a:cs typeface="Arial" panose="020B0604020202020204" pitchFamily="34" charset="0"/>
               </a:rPr>
-              <a:t>him. Later, James checks the </a:t>
+              <a:t>convince him. Later, James checks the </a:t>
             </a:r>
             <a:r>
               <a:rPr lang="en-US" sz="7200" b="1" dirty="0">
                 <a:latin typeface="Arial" panose="020B0604020202020204" pitchFamily="34" charset="0"/>
                 <a:cs typeface="Arial" panose="020B0604020202020204" pitchFamily="34" charset="0"/>
               </a:rPr>
-              <a:t>Orders </a:t>
-            </a:r>
-            <a:r>
-              <a:rPr lang="en-US" sz="7200" dirty="0">
-                <a:latin typeface="Arial" panose="020B0604020202020204" pitchFamily="34" charset="0"/>
-                <a:cs typeface="Arial" panose="020B0604020202020204" pitchFamily="34" charset="0"/>
-              </a:rPr>
-              <a:t>section</a:t>
+              <a:t>Items</a:t>
             </a:r>
           </a:p>
           <a:p>
@@ -12499,7 +12480,7 @@
                 <a:latin typeface="Arial" panose="020B0604020202020204" pitchFamily="34" charset="0"/>
                 <a:cs typeface="Arial" panose="020B0604020202020204" pitchFamily="34" charset="0"/>
               </a:rPr>
-              <a:t>to track his order's shipping status and notices</a:t>
+              <a:t>section to track his order's shipping status and</a:t>
             </a:r>
           </a:p>
           <a:p>
@@ -12511,7 +12492,7 @@
                 <a:latin typeface="Arial" panose="020B0604020202020204" pitchFamily="34" charset="0"/>
                 <a:cs typeface="Arial" panose="020B0604020202020204" pitchFamily="34" charset="0"/>
               </a:rPr>
-              <a:t>that price was not what he firstly saw. He then</a:t>
+              <a:t>notices that price was not what he firstly saw.</a:t>
             </a:r>
           </a:p>
           <a:p>
@@ -12523,7 +12504,7 @@
                 <a:latin typeface="Arial" panose="020B0604020202020204" pitchFamily="34" charset="0"/>
                 <a:cs typeface="Arial" panose="020B0604020202020204" pitchFamily="34" charset="0"/>
               </a:rPr>
-              <a:t>contacts support to address the issue.</a:t>
+              <a:t>Het then contacts support to address the issue.</a:t>
             </a:r>
           </a:p>
           <a:p>
@@ -14920,7 +14901,7 @@
                 <a:effectLst/>
                 <a:latin typeface="Arial" panose="020B0604020202020204" pitchFamily="34" charset="0"/>
               </a:rPr>
-              <a:t>Orders</a:t>
+              <a:t>Items</a:t>
             </a:r>
             <a:r>
               <a:rPr kumimoji="0" lang="es-ES" altLang="es-ES" sz="1800" b="0" i="0" u="none" strike="noStrike" cap="none" normalizeH="0" baseline="0" dirty="0">
@@ -14981,17 +14962,30 @@
               <a:t>he </a:t>
             </a:r>
             <a:r>
-              <a:rPr kumimoji="0" lang="es-ES" altLang="es-ES" sz="1800" b="0" i="0" u="none" strike="noStrike" cap="none" normalizeH="0" baseline="0">
-                <a:ln>
-                  <a:noFill/>
-                </a:ln>
-                <a:solidFill>
-                  <a:schemeClr val="tx1"/>
-                </a:solidFill>
-                <a:effectLst/>
-                <a:latin typeface="Arial" panose="020B0604020202020204" pitchFamily="34" charset="0"/>
-              </a:rPr>
-              <a:t>starts </a:t>
+              <a:rPr kumimoji="0" lang="es-ES" altLang="es-ES" sz="1800" b="0" i="0" u="none" strike="noStrike" cap="none" normalizeH="0" baseline="0" dirty="0" err="1">
+                <a:ln>
+                  <a:noFill/>
+                </a:ln>
+                <a:solidFill>
+                  <a:schemeClr val="tx1"/>
+                </a:solidFill>
+                <a:effectLst/>
+                <a:latin typeface="Arial" panose="020B0604020202020204" pitchFamily="34" charset="0"/>
+              </a:rPr>
+              <a:t>starts</a:t>
+            </a:r>
+            <a:r>
+              <a:rPr kumimoji="0" lang="es-ES" altLang="es-ES" sz="1800" b="0" i="0" u="none" strike="noStrike" cap="none" normalizeH="0" baseline="0" dirty="0">
+                <a:ln>
+                  <a:noFill/>
+                </a:ln>
+                <a:solidFill>
+                  <a:schemeClr val="tx1"/>
+                </a:solidFill>
+                <a:effectLst/>
+                <a:latin typeface="Arial" panose="020B0604020202020204" pitchFamily="34" charset="0"/>
+              </a:rPr>
+              <a:t> </a:t>
             </a:r>
             <a:r>
               <a:rPr kumimoji="0" lang="es-ES" altLang="es-ES" sz="1800" b="0" i="0" u="none" strike="noStrike" cap="none" normalizeH="0" baseline="0" dirty="0" err="1">

</xml_diff>